<commit_message>
Nesting of scales, abstractions code
</commit_message>
<xml_diff>
--- a/wip-compost/figures/graphics.pptx
+++ b/wip-compost/figures/graphics.pptx
@@ -244,7 +244,7 @@
           <a:p>
             <a:fld id="{4BA1A174-8390-4B21-80F6-9D83A7EFE031}" type="datetimeFigureOut">
               <a:rPr lang="en-US" smtClean="0"/>
-              <a:t>4/24/2020</a:t>
+              <a:t>5/1/2020</a:t>
             </a:fld>
             <a:endParaRPr lang="en-US"/>
           </a:p>
@@ -414,7 +414,7 @@
           <a:p>
             <a:fld id="{4BA1A174-8390-4B21-80F6-9D83A7EFE031}" type="datetimeFigureOut">
               <a:rPr lang="en-US" smtClean="0"/>
-              <a:t>4/24/2020</a:t>
+              <a:t>5/1/2020</a:t>
             </a:fld>
             <a:endParaRPr lang="en-US"/>
           </a:p>
@@ -594,7 +594,7 @@
           <a:p>
             <a:fld id="{4BA1A174-8390-4B21-80F6-9D83A7EFE031}" type="datetimeFigureOut">
               <a:rPr lang="en-US" smtClean="0"/>
-              <a:t>4/24/2020</a:t>
+              <a:t>5/1/2020</a:t>
             </a:fld>
             <a:endParaRPr lang="en-US"/>
           </a:p>
@@ -764,7 +764,7 @@
           <a:p>
             <a:fld id="{4BA1A174-8390-4B21-80F6-9D83A7EFE031}" type="datetimeFigureOut">
               <a:rPr lang="en-US" smtClean="0"/>
-              <a:t>4/24/2020</a:t>
+              <a:t>5/1/2020</a:t>
             </a:fld>
             <a:endParaRPr lang="en-US"/>
           </a:p>
@@ -1008,7 +1008,7 @@
           <a:p>
             <a:fld id="{4BA1A174-8390-4B21-80F6-9D83A7EFE031}" type="datetimeFigureOut">
               <a:rPr lang="en-US" smtClean="0"/>
-              <a:t>4/24/2020</a:t>
+              <a:t>5/1/2020</a:t>
             </a:fld>
             <a:endParaRPr lang="en-US"/>
           </a:p>
@@ -1240,7 +1240,7 @@
           <a:p>
             <a:fld id="{4BA1A174-8390-4B21-80F6-9D83A7EFE031}" type="datetimeFigureOut">
               <a:rPr lang="en-US" smtClean="0"/>
-              <a:t>4/24/2020</a:t>
+              <a:t>5/1/2020</a:t>
             </a:fld>
             <a:endParaRPr lang="en-US"/>
           </a:p>
@@ -1607,7 +1607,7 @@
           <a:p>
             <a:fld id="{4BA1A174-8390-4B21-80F6-9D83A7EFE031}" type="datetimeFigureOut">
               <a:rPr lang="en-US" smtClean="0"/>
-              <a:t>4/24/2020</a:t>
+              <a:t>5/1/2020</a:t>
             </a:fld>
             <a:endParaRPr lang="en-US"/>
           </a:p>
@@ -1725,7 +1725,7 @@
           <a:p>
             <a:fld id="{4BA1A174-8390-4B21-80F6-9D83A7EFE031}" type="datetimeFigureOut">
               <a:rPr lang="en-US" smtClean="0"/>
-              <a:t>4/24/2020</a:t>
+              <a:t>5/1/2020</a:t>
             </a:fld>
             <a:endParaRPr lang="en-US"/>
           </a:p>
@@ -1820,7 +1820,7 @@
           <a:p>
             <a:fld id="{4BA1A174-8390-4B21-80F6-9D83A7EFE031}" type="datetimeFigureOut">
               <a:rPr lang="en-US" smtClean="0"/>
-              <a:t>4/24/2020</a:t>
+              <a:t>5/1/2020</a:t>
             </a:fld>
             <a:endParaRPr lang="en-US"/>
           </a:p>
@@ -2097,7 +2097,7 @@
           <a:p>
             <a:fld id="{4BA1A174-8390-4B21-80F6-9D83A7EFE031}" type="datetimeFigureOut">
               <a:rPr lang="en-US" smtClean="0"/>
-              <a:t>4/24/2020</a:t>
+              <a:t>5/1/2020</a:t>
             </a:fld>
             <a:endParaRPr lang="en-US"/>
           </a:p>
@@ -2354,7 +2354,7 @@
           <a:p>
             <a:fld id="{4BA1A174-8390-4B21-80F6-9D83A7EFE031}" type="datetimeFigureOut">
               <a:rPr lang="en-US" smtClean="0"/>
-              <a:t>4/24/2020</a:t>
+              <a:t>5/1/2020</a:t>
             </a:fld>
             <a:endParaRPr lang="en-US"/>
           </a:p>
@@ -2567,7 +2567,7 @@
           <a:p>
             <a:fld id="{4BA1A174-8390-4B21-80F6-9D83A7EFE031}" type="datetimeFigureOut">
               <a:rPr lang="en-US" smtClean="0"/>
-              <a:t>4/24/2020</a:t>
+              <a:t>5/1/2020</a:t>
             </a:fld>
             <a:endParaRPr lang="en-US"/>
           </a:p>
@@ -4454,26 +4454,9 @@
           <a:lstStyle/>
           <a:p>
             <a:r>
-              <a:rPr lang="en-US" sz="800" dirty="0" err="1"/>
-              <a:t>v</a:t>
-            </a:r>
-            <a:r>
-              <a:rPr lang="en-US" sz="800" baseline="-25000" dirty="0" err="1"/>
-              <a:t>min</a:t>
-            </a:r>
-            <a:r>
               <a:rPr lang="en-US" sz="800" dirty="0"/>
-              <a:t>                                                 </a:t>
-            </a:r>
-            <a:r>
-              <a:rPr lang="en-US" sz="800" dirty="0" err="1"/>
-              <a:t>v</a:t>
-            </a:r>
-            <a:r>
-              <a:rPr lang="en-US" sz="800" baseline="-25000" dirty="0" err="1"/>
-              <a:t>max</a:t>
-            </a:r>
-            <a:endParaRPr lang="en-US" sz="800" dirty="0"/>
+              <a:t>0                                                      50                                                                  100</a:t>
+            </a:r>
           </a:p>
         </p:txBody>
       </p:sp>
@@ -4621,7 +4604,7 @@
         </p:nvSpPr>
         <p:spPr>
           <a:xfrm>
-            <a:off x="71049" y="245609"/>
+            <a:off x="21836" y="241532"/>
             <a:ext cx="3225682" cy="215444"/>
           </a:xfrm>
           <a:prstGeom prst="rect">
@@ -4637,13 +4620,8 @@
           <a:p>
             <a:r>
               <a:rPr lang="en-US" sz="800" dirty="0"/>
-              <a:t>0       1        2       </a:t>
-            </a:r>
-            <a:r>
-              <a:rPr lang="en-US" sz="800"/>
-              <a:t>3       4        5       6</a:t>
-            </a:r>
-            <a:endParaRPr lang="en-US" sz="800" dirty="0"/>
+              <a:t> 1.1             1.2             1.3              1.4</a:t>
+            </a:r>
           </a:p>
         </p:txBody>
       </p:sp>
@@ -5137,6 +5115,49 @@
         <p:spPr>
           <a:xfrm>
             <a:off x="1469587" y="167499"/>
+            <a:ext cx="0" cy="88849"/>
+          </a:xfrm>
+          <a:prstGeom prst="line">
+            <a:avLst/>
+          </a:prstGeom>
+          <a:ln w="12700">
+            <a:solidFill>
+              <a:schemeClr val="tx1"/>
+            </a:solidFill>
+          </a:ln>
+        </p:spPr>
+        <p:style>
+          <a:lnRef idx="1">
+            <a:schemeClr val="accent1"/>
+          </a:lnRef>
+          <a:fillRef idx="0">
+            <a:schemeClr val="accent1"/>
+          </a:fillRef>
+          <a:effectRef idx="0">
+            <a:schemeClr val="accent1"/>
+          </a:effectRef>
+          <a:fontRef idx="minor">
+            <a:schemeClr val="tx1"/>
+          </a:fontRef>
+        </p:style>
+      </p:cxnSp>
+      <p:cxnSp>
+        <p:nvCxnSpPr>
+          <p:cNvPr id="22" name="Straight Connector 21">
+            <a:extLst>
+              <a:ext uri="{FF2B5EF4-FFF2-40B4-BE49-F238E27FC236}">
+                <a16:creationId xmlns:a16="http://schemas.microsoft.com/office/drawing/2014/main" id="{4FC181C7-4926-4B72-A2C2-BB27AF653F46}"/>
+              </a:ext>
+            </a:extLst>
+          </p:cNvPr>
+          <p:cNvCxnSpPr>
+            <a:cxnSpLocks/>
+          </p:cNvCxnSpPr>
+          <p:nvPr/>
+        </p:nvCxnSpPr>
+        <p:spPr>
+          <a:xfrm>
+            <a:off x="3066612" y="508961"/>
             <a:ext cx="0" cy="88849"/>
           </a:xfrm>
           <a:prstGeom prst="line">

</xml_diff>